<commit_message>
Update to UI design to include correctly guess word
Refs #62
</commit_message>
<xml_diff>
--- a/Design/UIDesign/waiting_for_actor.pptx
+++ b/Design/UIDesign/waiting_for_actor.pptx
@@ -3030,8 +3030,8 @@
         </p:nvSpPr>
         <p:spPr>
           <a:xfrm>
-            <a:off x="2306972" y="1799929"/>
-            <a:ext cx="7399090" cy="1323439"/>
+            <a:off x="2940341" y="5144207"/>
+            <a:ext cx="6294540" cy="1077218"/>
           </a:xfrm>
           <a:prstGeom prst="rect">
             <a:avLst/>
@@ -3046,12 +3046,12 @@
           <a:p>
             <a:pPr algn="ctr"/>
             <a:r>
-              <a:rPr lang="en-GB" sz="4000" dirty="0">
+              <a:rPr lang="en-GB" sz="3200" dirty="0">
                 <a:solidFill>
                   <a:schemeClr val="bg1"/>
                 </a:solidFill>
               </a:rPr>
-              <a:t>Waiting for the actor to select a new (word / Phrase)</a:t>
+              <a:t>Waiting for the actor to select a new (word / Phrase)…</a:t>
             </a:r>
           </a:p>
         </p:txBody>
@@ -3064,7 +3064,7 @@
         </p:nvSpPr>
         <p:spPr>
           <a:xfrm>
-            <a:off x="2388066" y="3579793"/>
+            <a:off x="2388066" y="2828835"/>
             <a:ext cx="7399090" cy="1200329"/>
           </a:xfrm>
           <a:prstGeom prst="rect">
@@ -3097,6 +3097,40 @@
                 </a:solidFill>
               </a:rPr>
               <a:t>20 points</a:t>
+            </a:r>
+          </a:p>
+        </p:txBody>
+      </p:sp>
+      <p:sp>
+        <p:nvSpPr>
+          <p:cNvPr id="7" name="TextBox 6"/>
+          <p:cNvSpPr txBox="1"/>
+          <p:nvPr/>
+        </p:nvSpPr>
+        <p:spPr>
+          <a:xfrm>
+            <a:off x="2388066" y="390353"/>
+            <a:ext cx="7399090" cy="1938992"/>
+          </a:xfrm>
+          <a:prstGeom prst="rect">
+            <a:avLst/>
+          </a:prstGeom>
+          <a:noFill/>
+        </p:spPr>
+        <p:txBody>
+          <a:bodyPr wrap="square" rtlCol="0">
+            <a:spAutoFit/>
+          </a:bodyPr>
+          <a:lstStyle/>
+          <a:p>
+            <a:pPr algn="ctr"/>
+            <a:r>
+              <a:rPr lang="en-GB" sz="4000" dirty="0">
+                <a:solidFill>
+                  <a:schemeClr val="bg1"/>
+                </a:solidFill>
+              </a:rPr>
+              <a:t>(You / Someone else) guessed the (word / phrase) &lt;word/phrase&gt; correctly!</a:t>
             </a:r>
           </a:p>
         </p:txBody>

</xml_diff>